<commit_message>
egitim öncesi son push
</commit_message>
<xml_diff>
--- a/presentations/01. Tanışma, kursa giriş.pptx
+++ b/presentations/01. Tanışma, kursa giriş.pptx
@@ -980,7 +980,7 @@
           <a:p>
             <a:fld id="{50022E4D-3286-4CA6-9CB5-AD4BC87B100A}" type="datetimeFigureOut">
               <a:rPr lang="en-US" smtClean="0"/>
-              <a:t>10/1/2019</a:t>
+              <a:t>10/2/2019</a:t>
             </a:fld>
             <a:endParaRPr lang="en-US"/>
           </a:p>
@@ -1395,7 +1395,7 @@
           <a:p>
             <a:fld id="{BAB971F1-0A24-473E-8A66-D77E329B588E}" type="datetimeFigureOut">
               <a:rPr lang="tr-TR" smtClean="0"/>
-              <a:t>1.10.2019</a:t>
+              <a:t>2.10.2019</a:t>
             </a:fld>
             <a:endParaRPr lang="tr-TR"/>
           </a:p>
@@ -1593,7 +1593,7 @@
           <a:p>
             <a:fld id="{BAB971F1-0A24-473E-8A66-D77E329B588E}" type="datetimeFigureOut">
               <a:rPr lang="tr-TR" smtClean="0"/>
-              <a:t>1.10.2019</a:t>
+              <a:t>2.10.2019</a:t>
             </a:fld>
             <a:endParaRPr lang="tr-TR"/>
           </a:p>
@@ -1801,7 +1801,7 @@
           <a:p>
             <a:fld id="{BAB971F1-0A24-473E-8A66-D77E329B588E}" type="datetimeFigureOut">
               <a:rPr lang="tr-TR" smtClean="0"/>
-              <a:t>1.10.2019</a:t>
+              <a:t>2.10.2019</a:t>
             </a:fld>
             <a:endParaRPr lang="tr-TR"/>
           </a:p>
@@ -1999,7 +1999,7 @@
           <a:p>
             <a:fld id="{BAB971F1-0A24-473E-8A66-D77E329B588E}" type="datetimeFigureOut">
               <a:rPr lang="tr-TR" smtClean="0"/>
-              <a:t>1.10.2019</a:t>
+              <a:t>2.10.2019</a:t>
             </a:fld>
             <a:endParaRPr lang="tr-TR"/>
           </a:p>
@@ -2274,7 +2274,7 @@
           <a:p>
             <a:fld id="{BAB971F1-0A24-473E-8A66-D77E329B588E}" type="datetimeFigureOut">
               <a:rPr lang="tr-TR" smtClean="0"/>
-              <a:t>1.10.2019</a:t>
+              <a:t>2.10.2019</a:t>
             </a:fld>
             <a:endParaRPr lang="tr-TR"/>
           </a:p>
@@ -2539,7 +2539,7 @@
           <a:p>
             <a:fld id="{BAB971F1-0A24-473E-8A66-D77E329B588E}" type="datetimeFigureOut">
               <a:rPr lang="tr-TR" smtClean="0"/>
-              <a:t>1.10.2019</a:t>
+              <a:t>2.10.2019</a:t>
             </a:fld>
             <a:endParaRPr lang="tr-TR"/>
           </a:p>
@@ -2951,7 +2951,7 @@
           <a:p>
             <a:fld id="{BAB971F1-0A24-473E-8A66-D77E329B588E}" type="datetimeFigureOut">
               <a:rPr lang="tr-TR" smtClean="0"/>
-              <a:t>1.10.2019</a:t>
+              <a:t>2.10.2019</a:t>
             </a:fld>
             <a:endParaRPr lang="tr-TR"/>
           </a:p>
@@ -3092,7 +3092,7 @@
           <a:p>
             <a:fld id="{BAB971F1-0A24-473E-8A66-D77E329B588E}" type="datetimeFigureOut">
               <a:rPr lang="tr-TR" smtClean="0"/>
-              <a:t>1.10.2019</a:t>
+              <a:t>2.10.2019</a:t>
             </a:fld>
             <a:endParaRPr lang="tr-TR"/>
           </a:p>
@@ -3205,7 +3205,7 @@
           <a:p>
             <a:fld id="{BAB971F1-0A24-473E-8A66-D77E329B588E}" type="datetimeFigureOut">
               <a:rPr lang="tr-TR" smtClean="0"/>
-              <a:t>1.10.2019</a:t>
+              <a:t>2.10.2019</a:t>
             </a:fld>
             <a:endParaRPr lang="tr-TR"/>
           </a:p>
@@ -3516,7 +3516,7 @@
           <a:p>
             <a:fld id="{BAB971F1-0A24-473E-8A66-D77E329B588E}" type="datetimeFigureOut">
               <a:rPr lang="tr-TR" smtClean="0"/>
-              <a:t>1.10.2019</a:t>
+              <a:t>2.10.2019</a:t>
             </a:fld>
             <a:endParaRPr lang="tr-TR"/>
           </a:p>
@@ -3804,7 +3804,7 @@
           <a:p>
             <a:fld id="{BAB971F1-0A24-473E-8A66-D77E329B588E}" type="datetimeFigureOut">
               <a:rPr lang="tr-TR" smtClean="0"/>
-              <a:t>1.10.2019</a:t>
+              <a:t>2.10.2019</a:t>
             </a:fld>
             <a:endParaRPr lang="tr-TR"/>
           </a:p>
@@ -4045,7 +4045,7 @@
           <a:p>
             <a:fld id="{BAB971F1-0A24-473E-8A66-D77E329B588E}" type="datetimeFigureOut">
               <a:rPr lang="tr-TR" smtClean="0"/>
-              <a:t>1.10.2019</a:t>
+              <a:t>2.10.2019</a:t>
             </a:fld>
             <a:endParaRPr lang="tr-TR"/>
           </a:p>
@@ -4464,45 +4464,10 @@
       </p:grpSpPr>
       <p:pic>
         <p:nvPicPr>
-          <p:cNvPr id="3" name="Resim 2">
-            <a:extLst>
-              <a:ext uri="{FF2B5EF4-FFF2-40B4-BE49-F238E27FC236}">
-                <a16:creationId xmlns:a16="http://schemas.microsoft.com/office/drawing/2014/main" id="{84543764-F662-4FCF-BA00-6D7FDF5E574C}"/>
-              </a:ext>
-            </a:extLst>
-          </p:cNvPr>
-          <p:cNvPicPr>
-            <a:picLocks noChangeAspect="1"/>
-          </p:cNvPicPr>
-          <p:nvPr/>
-        </p:nvPicPr>
-        <p:blipFill rotWithShape="1">
-          <a:blip r:embed="rId2">
-            <a:extLst>
-              <a:ext uri="{28A0092B-C50C-407E-A947-70E740481C1C}">
-                <a14:useLocalDpi xmlns:a14="http://schemas.microsoft.com/office/drawing/2010/main" val="0"/>
-              </a:ext>
-            </a:extLst>
-          </a:blip>
-          <a:srcRect r="1235"/>
-          <a:stretch/>
-        </p:blipFill>
-        <p:spPr>
-          <a:xfrm>
-            <a:off x="0" y="0"/>
-            <a:ext cx="12192000" cy="6858000"/>
-          </a:xfrm>
-          <a:prstGeom prst="rect">
-            <a:avLst/>
-          </a:prstGeom>
-        </p:spPr>
-      </p:pic>
-      <p:pic>
-        <p:nvPicPr>
-          <p:cNvPr id="4" name="Resim 3">
-            <a:extLst>
-              <a:ext uri="{FF2B5EF4-FFF2-40B4-BE49-F238E27FC236}">
-                <a16:creationId xmlns:a16="http://schemas.microsoft.com/office/drawing/2014/main" id="{E17C1C7D-5B38-414F-93F0-288AC2C55C96}"/>
+          <p:cNvPr id="7" name="Resim 6">
+            <a:extLst>
+              <a:ext uri="{FF2B5EF4-FFF2-40B4-BE49-F238E27FC236}">
+                <a16:creationId xmlns:a16="http://schemas.microsoft.com/office/drawing/2014/main" id="{44080A65-0F58-41F9-B058-F53B4B55B90E}"/>
               </a:ext>
             </a:extLst>
           </p:cNvPr>
@@ -4512,7 +4477,7 @@
           <p:nvPr/>
         </p:nvPicPr>
         <p:blipFill>
-          <a:blip r:embed="rId3">
+          <a:blip r:embed="rId2">
             <a:extLst>
               <a:ext uri="{28A0092B-C50C-407E-A947-70E740481C1C}">
                 <a14:useLocalDpi xmlns:a14="http://schemas.microsoft.com/office/drawing/2010/main" val="0"/>
@@ -4525,8 +4490,8 @@
         </p:blipFill>
         <p:spPr>
           <a:xfrm>
-            <a:off x="267025" y="5963548"/>
-            <a:ext cx="4961192" cy="710010"/>
+            <a:off x="-76200" y="0"/>
+            <a:ext cx="12344400" cy="6858000"/>
           </a:xfrm>
           <a:prstGeom prst="rect">
             <a:avLst/>
@@ -4636,7 +4601,7 @@
         </p:blipFill>
         <p:spPr bwMode="auto">
           <a:xfrm>
-            <a:off x="1344706" y="1163917"/>
+            <a:off x="1344706" y="924232"/>
             <a:ext cx="9502588" cy="5068047"/>
           </a:xfrm>
           <a:prstGeom prst="rect">
@@ -4728,6 +4693,49 @@
           </a:prstGeom>
         </p:spPr>
       </p:pic>
+      <p:sp>
+        <p:nvSpPr>
+          <p:cNvPr id="3" name="Metin kutusu 2">
+            <a:extLst>
+              <a:ext uri="{FF2B5EF4-FFF2-40B4-BE49-F238E27FC236}">
+                <a16:creationId xmlns:a16="http://schemas.microsoft.com/office/drawing/2014/main" id="{8B6AB30B-4D60-4B4D-B3F0-6FFDC5E15D39}"/>
+              </a:ext>
+            </a:extLst>
+          </p:cNvPr>
+          <p:cNvSpPr txBox="1"/>
+          <p:nvPr/>
+        </p:nvSpPr>
+        <p:spPr>
+          <a:xfrm>
+            <a:off x="5067299" y="3362325"/>
+            <a:ext cx="2057401" cy="1323439"/>
+          </a:xfrm>
+          <a:prstGeom prst="rect">
+            <a:avLst/>
+          </a:prstGeom>
+          <a:solidFill>
+            <a:srgbClr val="9B1B1C"/>
+          </a:solidFill>
+        </p:spPr>
+        <p:txBody>
+          <a:bodyPr wrap="square" rtlCol="0">
+            <a:spAutoFit/>
+          </a:bodyPr>
+          <a:lstStyle/>
+          <a:p>
+            <a:pPr algn="ctr"/>
+            <a:r>
+              <a:rPr lang="tr-TR" sz="8000" b="1" dirty="0">
+                <a:solidFill>
+                  <a:schemeClr val="bg1"/>
+                </a:solidFill>
+                <a:latin typeface="Roboto"/>
+              </a:rPr>
+              <a:t>101</a:t>
+            </a:r>
+          </a:p>
+        </p:txBody>
+      </p:sp>
     </p:spTree>
     <p:extLst>
       <p:ext uri="{BB962C8B-B14F-4D97-AF65-F5344CB8AC3E}">
@@ -4741,6 +4749,174 @@
   <p:transition spd="slow">
     <p:push dir="u"/>
   </p:transition>
+  <p:timing>
+    <p:tnLst>
+      <p:par>
+        <p:cTn id="1" dur="indefinite" restart="never" nodeType="tmRoot">
+          <p:childTnLst>
+            <p:seq concurrent="1" nextAc="seek">
+              <p:cTn id="2" dur="indefinite" nodeType="mainSeq">
+                <p:childTnLst>
+                  <p:par>
+                    <p:cTn id="3" fill="hold">
+                      <p:stCondLst>
+                        <p:cond delay="indefinite"/>
+                      </p:stCondLst>
+                      <p:childTnLst>
+                        <p:par>
+                          <p:cTn id="4" fill="hold">
+                            <p:stCondLst>
+                              <p:cond delay="0"/>
+                            </p:stCondLst>
+                            <p:childTnLst>
+                              <p:par>
+                                <p:cTn id="5" presetID="53" presetClass="entr" presetSubtype="16" fill="hold" grpId="0" nodeType="clickEffect">
+                                  <p:stCondLst>
+                                    <p:cond delay="0"/>
+                                  </p:stCondLst>
+                                  <p:childTnLst>
+                                    <p:set>
+                                      <p:cBhvr>
+                                        <p:cTn id="6" dur="1" fill="hold">
+                                          <p:stCondLst>
+                                            <p:cond delay="0"/>
+                                          </p:stCondLst>
+                                        </p:cTn>
+                                        <p:tgtEl>
+                                          <p:spTgt spid="3"/>
+                                        </p:tgtEl>
+                                        <p:attrNameLst>
+                                          <p:attrName>style.visibility</p:attrName>
+                                        </p:attrNameLst>
+                                      </p:cBhvr>
+                                      <p:to>
+                                        <p:strVal val="visible"/>
+                                      </p:to>
+                                    </p:set>
+                                    <p:anim calcmode="lin" valueType="num">
+                                      <p:cBhvr>
+                                        <p:cTn id="7" dur="500" fill="hold"/>
+                                        <p:tgtEl>
+                                          <p:spTgt spid="3"/>
+                                        </p:tgtEl>
+                                        <p:attrNameLst>
+                                          <p:attrName>ppt_w</p:attrName>
+                                        </p:attrNameLst>
+                                      </p:cBhvr>
+                                      <p:tavLst>
+                                        <p:tav tm="0">
+                                          <p:val>
+                                            <p:fltVal val="0"/>
+                                          </p:val>
+                                        </p:tav>
+                                        <p:tav tm="100000">
+                                          <p:val>
+                                            <p:strVal val="#ppt_w"/>
+                                          </p:val>
+                                        </p:tav>
+                                      </p:tavLst>
+                                    </p:anim>
+                                    <p:anim calcmode="lin" valueType="num">
+                                      <p:cBhvr>
+                                        <p:cTn id="8" dur="500" fill="hold"/>
+                                        <p:tgtEl>
+                                          <p:spTgt spid="3"/>
+                                        </p:tgtEl>
+                                        <p:attrNameLst>
+                                          <p:attrName>ppt_h</p:attrName>
+                                        </p:attrNameLst>
+                                      </p:cBhvr>
+                                      <p:tavLst>
+                                        <p:tav tm="0">
+                                          <p:val>
+                                            <p:fltVal val="0"/>
+                                          </p:val>
+                                        </p:tav>
+                                        <p:tav tm="100000">
+                                          <p:val>
+                                            <p:strVal val="#ppt_h"/>
+                                          </p:val>
+                                        </p:tav>
+                                      </p:tavLst>
+                                    </p:anim>
+                                    <p:animEffect transition="in" filter="fade">
+                                      <p:cBhvr>
+                                        <p:cTn id="9" dur="500"/>
+                                        <p:tgtEl>
+                                          <p:spTgt spid="3"/>
+                                        </p:tgtEl>
+                                      </p:cBhvr>
+                                    </p:animEffect>
+                                  </p:childTnLst>
+                                </p:cTn>
+                              </p:par>
+                            </p:childTnLst>
+                          </p:cTn>
+                        </p:par>
+                        <p:par>
+                          <p:cTn id="10" fill="hold">
+                            <p:stCondLst>
+                              <p:cond delay="500"/>
+                            </p:stCondLst>
+                            <p:childTnLst>
+                              <p:par>
+                                <p:cTn id="11" presetID="26" presetClass="emph" presetSubtype="0" repeatCount="indefinite" fill="hold" grpId="1" nodeType="afterEffect">
+                                  <p:stCondLst>
+                                    <p:cond delay="0"/>
+                                  </p:stCondLst>
+                                  <p:childTnLst>
+                                    <p:animEffect transition="out" filter="fade">
+                                      <p:cBhvr>
+                                        <p:cTn id="12" dur="1500" tmFilter="0, 0; .2, .5; .8, .5; 1, 0"/>
+                                        <p:tgtEl>
+                                          <p:spTgt spid="3"/>
+                                        </p:tgtEl>
+                                      </p:cBhvr>
+                                    </p:animEffect>
+                                    <p:animScale>
+                                      <p:cBhvr>
+                                        <p:cTn id="13" dur="750" autoRev="1" fill="hold"/>
+                                        <p:tgtEl>
+                                          <p:spTgt spid="3"/>
+                                        </p:tgtEl>
+                                      </p:cBhvr>
+                                      <p:by x="105000" y="105000"/>
+                                    </p:animScale>
+                                  </p:childTnLst>
+                                </p:cTn>
+                              </p:par>
+                            </p:childTnLst>
+                          </p:cTn>
+                        </p:par>
+                      </p:childTnLst>
+                    </p:cTn>
+                  </p:par>
+                </p:childTnLst>
+              </p:cTn>
+              <p:prevCondLst>
+                <p:cond evt="onPrev" delay="0">
+                  <p:tgtEl>
+                    <p:sldTgt/>
+                  </p:tgtEl>
+                </p:cond>
+              </p:prevCondLst>
+              <p:nextCondLst>
+                <p:cond evt="onNext" delay="0">
+                  <p:tgtEl>
+                    <p:sldTgt/>
+                  </p:tgtEl>
+                </p:cond>
+              </p:nextCondLst>
+            </p:seq>
+          </p:childTnLst>
+        </p:cTn>
+      </p:par>
+    </p:tnLst>
+    <p:bldLst>
+      <p:bldP spid="3" grpId="0" animBg="1"/>
+      <p:bldP spid="3" grpId="1" animBg="1"/>
+    </p:bldLst>
+  </p:timing>
 </p:sld>
 </file>
 
@@ -8192,7 +8368,7 @@
                             </p:stCondLst>
                             <p:childTnLst>
                               <p:par>
-                                <p:cTn id="5" presetID="10" presetClass="entr" presetSubtype="0" fill="hold" nodeType="clickEffect">
+                                <p:cTn id="5" presetID="1" presetClass="entr" presetSubtype="0" fill="hold" grpId="0" nodeType="clickEffect">
                                   <p:stCondLst>
                                     <p:cond delay="0"/>
                                   </p:stCondLst>
@@ -8205,11 +8381,7 @@
                                           </p:stCondLst>
                                         </p:cTn>
                                         <p:tgtEl>
-                                          <p:spTgt spid="3">
-                                            <p:txEl>
-                                              <p:pRg st="0" end="0"/>
-                                            </p:txEl>
-                                          </p:spTgt>
+                                          <p:spTgt spid="3"/>
                                         </p:tgtEl>
                                         <p:attrNameLst>
                                           <p:attrName>style.visibility</p:attrName>
@@ -8219,384 +8391,6 @@
                                         <p:strVal val="visible"/>
                                       </p:to>
                                     </p:set>
-                                    <p:animEffect transition="in" filter="fade">
-                                      <p:cBhvr>
-                                        <p:cTn id="7" dur="500"/>
-                                        <p:tgtEl>
-                                          <p:spTgt spid="3">
-                                            <p:txEl>
-                                              <p:pRg st="0" end="0"/>
-                                            </p:txEl>
-                                          </p:spTgt>
-                                        </p:tgtEl>
-                                      </p:cBhvr>
-                                    </p:animEffect>
-                                  </p:childTnLst>
-                                </p:cTn>
-                              </p:par>
-                            </p:childTnLst>
-                          </p:cTn>
-                        </p:par>
-                      </p:childTnLst>
-                    </p:cTn>
-                  </p:par>
-                  <p:par>
-                    <p:cTn id="8" fill="hold">
-                      <p:stCondLst>
-                        <p:cond delay="indefinite"/>
-                      </p:stCondLst>
-                      <p:childTnLst>
-                        <p:par>
-                          <p:cTn id="9" fill="hold">
-                            <p:stCondLst>
-                              <p:cond delay="0"/>
-                            </p:stCondLst>
-                            <p:childTnLst>
-                              <p:par>
-                                <p:cTn id="10" presetID="10" presetClass="entr" presetSubtype="0" fill="hold" nodeType="clickEffect">
-                                  <p:stCondLst>
-                                    <p:cond delay="0"/>
-                                  </p:stCondLst>
-                                  <p:childTnLst>
-                                    <p:set>
-                                      <p:cBhvr>
-                                        <p:cTn id="11" dur="1" fill="hold">
-                                          <p:stCondLst>
-                                            <p:cond delay="0"/>
-                                          </p:stCondLst>
-                                        </p:cTn>
-                                        <p:tgtEl>
-                                          <p:spTgt spid="3">
-                                            <p:txEl>
-                                              <p:pRg st="1" end="1"/>
-                                            </p:txEl>
-                                          </p:spTgt>
-                                        </p:tgtEl>
-                                        <p:attrNameLst>
-                                          <p:attrName>style.visibility</p:attrName>
-                                        </p:attrNameLst>
-                                      </p:cBhvr>
-                                      <p:to>
-                                        <p:strVal val="visible"/>
-                                      </p:to>
-                                    </p:set>
-                                    <p:animEffect transition="in" filter="fade">
-                                      <p:cBhvr>
-                                        <p:cTn id="12" dur="500"/>
-                                        <p:tgtEl>
-                                          <p:spTgt spid="3">
-                                            <p:txEl>
-                                              <p:pRg st="1" end="1"/>
-                                            </p:txEl>
-                                          </p:spTgt>
-                                        </p:tgtEl>
-                                      </p:cBhvr>
-                                    </p:animEffect>
-                                  </p:childTnLst>
-                                </p:cTn>
-                              </p:par>
-                            </p:childTnLst>
-                          </p:cTn>
-                        </p:par>
-                      </p:childTnLst>
-                    </p:cTn>
-                  </p:par>
-                  <p:par>
-                    <p:cTn id="13" fill="hold">
-                      <p:stCondLst>
-                        <p:cond delay="indefinite"/>
-                      </p:stCondLst>
-                      <p:childTnLst>
-                        <p:par>
-                          <p:cTn id="14" fill="hold">
-                            <p:stCondLst>
-                              <p:cond delay="0"/>
-                            </p:stCondLst>
-                            <p:childTnLst>
-                              <p:par>
-                                <p:cTn id="15" presetID="10" presetClass="entr" presetSubtype="0" fill="hold" nodeType="clickEffect">
-                                  <p:stCondLst>
-                                    <p:cond delay="0"/>
-                                  </p:stCondLst>
-                                  <p:childTnLst>
-                                    <p:set>
-                                      <p:cBhvr>
-                                        <p:cTn id="16" dur="1" fill="hold">
-                                          <p:stCondLst>
-                                            <p:cond delay="0"/>
-                                          </p:stCondLst>
-                                        </p:cTn>
-                                        <p:tgtEl>
-                                          <p:spTgt spid="3">
-                                            <p:txEl>
-                                              <p:pRg st="2" end="2"/>
-                                            </p:txEl>
-                                          </p:spTgt>
-                                        </p:tgtEl>
-                                        <p:attrNameLst>
-                                          <p:attrName>style.visibility</p:attrName>
-                                        </p:attrNameLst>
-                                      </p:cBhvr>
-                                      <p:to>
-                                        <p:strVal val="visible"/>
-                                      </p:to>
-                                    </p:set>
-                                    <p:animEffect transition="in" filter="fade">
-                                      <p:cBhvr>
-                                        <p:cTn id="17" dur="500"/>
-                                        <p:tgtEl>
-                                          <p:spTgt spid="3">
-                                            <p:txEl>
-                                              <p:pRg st="2" end="2"/>
-                                            </p:txEl>
-                                          </p:spTgt>
-                                        </p:tgtEl>
-                                      </p:cBhvr>
-                                    </p:animEffect>
-                                  </p:childTnLst>
-                                </p:cTn>
-                              </p:par>
-                            </p:childTnLst>
-                          </p:cTn>
-                        </p:par>
-                      </p:childTnLst>
-                    </p:cTn>
-                  </p:par>
-                  <p:par>
-                    <p:cTn id="18" fill="hold">
-                      <p:stCondLst>
-                        <p:cond delay="indefinite"/>
-                      </p:stCondLst>
-                      <p:childTnLst>
-                        <p:par>
-                          <p:cTn id="19" fill="hold">
-                            <p:stCondLst>
-                              <p:cond delay="0"/>
-                            </p:stCondLst>
-                            <p:childTnLst>
-                              <p:par>
-                                <p:cTn id="20" presetID="10" presetClass="entr" presetSubtype="0" fill="hold" nodeType="clickEffect">
-                                  <p:stCondLst>
-                                    <p:cond delay="0"/>
-                                  </p:stCondLst>
-                                  <p:childTnLst>
-                                    <p:set>
-                                      <p:cBhvr>
-                                        <p:cTn id="21" dur="1" fill="hold">
-                                          <p:stCondLst>
-                                            <p:cond delay="0"/>
-                                          </p:stCondLst>
-                                        </p:cTn>
-                                        <p:tgtEl>
-                                          <p:spTgt spid="3">
-                                            <p:txEl>
-                                              <p:pRg st="3" end="3"/>
-                                            </p:txEl>
-                                          </p:spTgt>
-                                        </p:tgtEl>
-                                        <p:attrNameLst>
-                                          <p:attrName>style.visibility</p:attrName>
-                                        </p:attrNameLst>
-                                      </p:cBhvr>
-                                      <p:to>
-                                        <p:strVal val="visible"/>
-                                      </p:to>
-                                    </p:set>
-                                    <p:animEffect transition="in" filter="fade">
-                                      <p:cBhvr>
-                                        <p:cTn id="22" dur="500"/>
-                                        <p:tgtEl>
-                                          <p:spTgt spid="3">
-                                            <p:txEl>
-                                              <p:pRg st="3" end="3"/>
-                                            </p:txEl>
-                                          </p:spTgt>
-                                        </p:tgtEl>
-                                      </p:cBhvr>
-                                    </p:animEffect>
-                                  </p:childTnLst>
-                                </p:cTn>
-                              </p:par>
-                            </p:childTnLst>
-                          </p:cTn>
-                        </p:par>
-                      </p:childTnLst>
-                    </p:cTn>
-                  </p:par>
-                  <p:par>
-                    <p:cTn id="23" fill="hold">
-                      <p:stCondLst>
-                        <p:cond delay="indefinite"/>
-                      </p:stCondLst>
-                      <p:childTnLst>
-                        <p:par>
-                          <p:cTn id="24" fill="hold">
-                            <p:stCondLst>
-                              <p:cond delay="0"/>
-                            </p:stCondLst>
-                            <p:childTnLst>
-                              <p:par>
-                                <p:cTn id="25" presetID="10" presetClass="entr" presetSubtype="0" fill="hold" nodeType="clickEffect">
-                                  <p:stCondLst>
-                                    <p:cond delay="0"/>
-                                  </p:stCondLst>
-                                  <p:childTnLst>
-                                    <p:set>
-                                      <p:cBhvr>
-                                        <p:cTn id="26" dur="1" fill="hold">
-                                          <p:stCondLst>
-                                            <p:cond delay="0"/>
-                                          </p:stCondLst>
-                                        </p:cTn>
-                                        <p:tgtEl>
-                                          <p:spTgt spid="3">
-                                            <p:txEl>
-                                              <p:pRg st="4" end="4"/>
-                                            </p:txEl>
-                                          </p:spTgt>
-                                        </p:tgtEl>
-                                        <p:attrNameLst>
-                                          <p:attrName>style.visibility</p:attrName>
-                                        </p:attrNameLst>
-                                      </p:cBhvr>
-                                      <p:to>
-                                        <p:strVal val="visible"/>
-                                      </p:to>
-                                    </p:set>
-                                    <p:animEffect transition="in" filter="fade">
-                                      <p:cBhvr>
-                                        <p:cTn id="27" dur="500"/>
-                                        <p:tgtEl>
-                                          <p:spTgt spid="3">
-                                            <p:txEl>
-                                              <p:pRg st="4" end="4"/>
-                                            </p:txEl>
-                                          </p:spTgt>
-                                        </p:tgtEl>
-                                      </p:cBhvr>
-                                    </p:animEffect>
-                                  </p:childTnLst>
-                                </p:cTn>
-                              </p:par>
-                            </p:childTnLst>
-                          </p:cTn>
-                        </p:par>
-                      </p:childTnLst>
-                    </p:cTn>
-                  </p:par>
-                  <p:par>
-                    <p:cTn id="28" fill="hold">
-                      <p:stCondLst>
-                        <p:cond delay="indefinite"/>
-                      </p:stCondLst>
-                      <p:childTnLst>
-                        <p:par>
-                          <p:cTn id="29" fill="hold">
-                            <p:stCondLst>
-                              <p:cond delay="0"/>
-                            </p:stCondLst>
-                            <p:childTnLst>
-                              <p:par>
-                                <p:cTn id="30" presetID="10" presetClass="entr" presetSubtype="0" fill="hold" nodeType="clickEffect">
-                                  <p:stCondLst>
-                                    <p:cond delay="0"/>
-                                  </p:stCondLst>
-                                  <p:childTnLst>
-                                    <p:set>
-                                      <p:cBhvr>
-                                        <p:cTn id="31" dur="1" fill="hold">
-                                          <p:stCondLst>
-                                            <p:cond delay="0"/>
-                                          </p:stCondLst>
-                                        </p:cTn>
-                                        <p:tgtEl>
-                                          <p:spTgt spid="3">
-                                            <p:txEl>
-                                              <p:pRg st="5" end="5"/>
-                                            </p:txEl>
-                                          </p:spTgt>
-                                        </p:tgtEl>
-                                        <p:attrNameLst>
-                                          <p:attrName>style.visibility</p:attrName>
-                                        </p:attrNameLst>
-                                      </p:cBhvr>
-                                      <p:to>
-                                        <p:strVal val="visible"/>
-                                      </p:to>
-                                    </p:set>
-                                    <p:animEffect transition="in" filter="fade">
-                                      <p:cBhvr>
-                                        <p:cTn id="32" dur="500"/>
-                                        <p:tgtEl>
-                                          <p:spTgt spid="3">
-                                            <p:txEl>
-                                              <p:pRg st="5" end="5"/>
-                                            </p:txEl>
-                                          </p:spTgt>
-                                        </p:tgtEl>
-                                      </p:cBhvr>
-                                    </p:animEffect>
-                                  </p:childTnLst>
-                                </p:cTn>
-                              </p:par>
-                            </p:childTnLst>
-                          </p:cTn>
-                        </p:par>
-                      </p:childTnLst>
-                    </p:cTn>
-                  </p:par>
-                  <p:par>
-                    <p:cTn id="33" fill="hold">
-                      <p:stCondLst>
-                        <p:cond delay="indefinite"/>
-                      </p:stCondLst>
-                      <p:childTnLst>
-                        <p:par>
-                          <p:cTn id="34" fill="hold">
-                            <p:stCondLst>
-                              <p:cond delay="0"/>
-                            </p:stCondLst>
-                            <p:childTnLst>
-                              <p:par>
-                                <p:cTn id="35" presetID="10" presetClass="entr" presetSubtype="0" fill="hold" nodeType="clickEffect">
-                                  <p:stCondLst>
-                                    <p:cond delay="0"/>
-                                  </p:stCondLst>
-                                  <p:childTnLst>
-                                    <p:set>
-                                      <p:cBhvr>
-                                        <p:cTn id="36" dur="1" fill="hold">
-                                          <p:stCondLst>
-                                            <p:cond delay="0"/>
-                                          </p:stCondLst>
-                                        </p:cTn>
-                                        <p:tgtEl>
-                                          <p:spTgt spid="3">
-                                            <p:txEl>
-                                              <p:pRg st="6" end="6"/>
-                                            </p:txEl>
-                                          </p:spTgt>
-                                        </p:tgtEl>
-                                        <p:attrNameLst>
-                                          <p:attrName>style.visibility</p:attrName>
-                                        </p:attrNameLst>
-                                      </p:cBhvr>
-                                      <p:to>
-                                        <p:strVal val="visible"/>
-                                      </p:to>
-                                    </p:set>
-                                    <p:animEffect transition="in" filter="fade">
-                                      <p:cBhvr>
-                                        <p:cTn id="37" dur="500"/>
-                                        <p:tgtEl>
-                                          <p:spTgt spid="3">
-                                            <p:txEl>
-                                              <p:pRg st="6" end="6"/>
-                                            </p:txEl>
-                                          </p:spTgt>
-                                        </p:tgtEl>
-                                      </p:cBhvr>
-                                    </p:animEffect>
                                   </p:childTnLst>
                                 </p:cTn>
                               </p:par>
@@ -8627,6 +8421,9 @@
         </p:cTn>
       </p:par>
     </p:tnLst>
+    <p:bldLst>
+      <p:bldP spid="3" grpId="0"/>
+    </p:bldLst>
   </p:timing>
 </p:sld>
 </file>
@@ -8661,7 +8458,7 @@
         <p:spPr>
           <a:xfrm>
             <a:off x="3574026" y="304799"/>
-            <a:ext cx="5043948" cy="619433"/>
+            <a:ext cx="5043948" cy="1162051"/>
           </a:xfrm>
         </p:spPr>
         <p:txBody>
@@ -8679,7 +8476,7 @@
                 <a:ea typeface="+mn-ea"/>
                 <a:cs typeface="+mn-cs"/>
               </a:rPr>
-              <a:t>Eğitim Hakkında</a:t>
+              <a:t>Eğitim Dokümantasyonu</a:t>
             </a:r>
             <a:endParaRPr lang="en-US" sz="4000" b="1" dirty="0">
               <a:solidFill>
@@ -8706,7 +8503,7 @@
         </p:nvSpPr>
         <p:spPr>
           <a:xfrm>
-            <a:off x="1904522" y="1248163"/>
+            <a:off x="1714022" y="1676788"/>
             <a:ext cx="8976852" cy="2793842"/>
           </a:xfrm>
           <a:prstGeom prst="rect">
@@ -8746,10 +8543,10 @@
               </a:lnSpc>
             </a:pPr>
             <a:r>
-              <a:rPr lang="en-US" sz="2400" dirty="0">
+              <a:rPr lang="tr-TR" sz="2400" dirty="0">
                 <a:hlinkClick r:id="rId2"/>
               </a:rPr>
-              <a:t>https://github.com/erkansirin78/oneday-introduction-to-python-ml</a:t>
+              <a:t>https://github.com/erkansirin78/machine-learning-with-python-101</a:t>
             </a:r>
             <a:endParaRPr lang="tr-TR" sz="2400" dirty="0"/>
           </a:p>
@@ -8763,7 +8560,7 @@
               <a:rPr lang="tr-TR" sz="2400" dirty="0">
                 <a:latin typeface="Roboto"/>
               </a:rPr>
-              <a:t>2. Eğitim dokümanları buradadır, güncellemeler işlenecektir.</a:t>
+              <a:t>2. Eğitime ait kodlar ve sunumlar buradadır, güncellemeler işlenecektir.</a:t>
             </a:r>
           </a:p>
           <a:p>
@@ -8778,17 +8575,6 @@
               </a:rPr>
               <a:t>3. IDE olarak Jupyter kullanılacaktır.</a:t>
             </a:r>
-          </a:p>
-          <a:p>
-            <a:pPr marL="342900" indent="-342900">
-              <a:lnSpc>
-                <a:spcPct val="150000"/>
-              </a:lnSpc>
-              <a:buAutoNum type="arabicPeriod"/>
-            </a:pPr>
-            <a:endParaRPr lang="tr-TR" sz="2400" dirty="0">
-              <a:latin typeface="Roboto"/>
-            </a:endParaRPr>
           </a:p>
         </p:txBody>
       </p:sp>
@@ -9455,7 +9241,7 @@
                             </p:stCondLst>
                             <p:childTnLst>
                               <p:par>
-                                <p:cTn id="5" presetID="10" presetClass="entr" presetSubtype="0" fill="hold" nodeType="clickEffect">
+                                <p:cTn id="5" presetID="10" presetClass="entr" presetSubtype="0" fill="hold" grpId="0" nodeType="clickEffect">
                                   <p:stCondLst>
                                     <p:cond delay="0"/>
                                   </p:stCondLst>
@@ -9468,11 +9254,7 @@
                                           </p:stCondLst>
                                         </p:cTn>
                                         <p:tgtEl>
-                                          <p:spTgt spid="3">
-                                            <p:txEl>
-                                              <p:pRg st="0" end="0"/>
-                                            </p:txEl>
-                                          </p:spTgt>
+                                          <p:spTgt spid="3"/>
                                         </p:tgtEl>
                                         <p:attrNameLst>
                                           <p:attrName>style.visibility</p:attrName>
@@ -9486,560 +9268,7 @@
                                       <p:cBhvr>
                                         <p:cTn id="7" dur="500"/>
                                         <p:tgtEl>
-                                          <p:spTgt spid="3">
-                                            <p:txEl>
-                                              <p:pRg st="0" end="0"/>
-                                            </p:txEl>
-                                          </p:spTgt>
-                                        </p:tgtEl>
-                                      </p:cBhvr>
-                                    </p:animEffect>
-                                  </p:childTnLst>
-                                </p:cTn>
-                              </p:par>
-                            </p:childTnLst>
-                          </p:cTn>
-                        </p:par>
-                      </p:childTnLst>
-                    </p:cTn>
-                  </p:par>
-                  <p:par>
-                    <p:cTn id="8" fill="hold">
-                      <p:stCondLst>
-                        <p:cond delay="indefinite"/>
-                      </p:stCondLst>
-                      <p:childTnLst>
-                        <p:par>
-                          <p:cTn id="9" fill="hold">
-                            <p:stCondLst>
-                              <p:cond delay="0"/>
-                            </p:stCondLst>
-                            <p:childTnLst>
-                              <p:par>
-                                <p:cTn id="10" presetID="10" presetClass="entr" presetSubtype="0" fill="hold" nodeType="clickEffect">
-                                  <p:stCondLst>
-                                    <p:cond delay="0"/>
-                                  </p:stCondLst>
-                                  <p:childTnLst>
-                                    <p:set>
-                                      <p:cBhvr>
-                                        <p:cTn id="11" dur="1" fill="hold">
-                                          <p:stCondLst>
-                                            <p:cond delay="0"/>
-                                          </p:stCondLst>
-                                        </p:cTn>
-                                        <p:tgtEl>
-                                          <p:spTgt spid="3">
-                                            <p:txEl>
-                                              <p:pRg st="1" end="1"/>
-                                            </p:txEl>
-                                          </p:spTgt>
-                                        </p:tgtEl>
-                                        <p:attrNameLst>
-                                          <p:attrName>style.visibility</p:attrName>
-                                        </p:attrNameLst>
-                                      </p:cBhvr>
-                                      <p:to>
-                                        <p:strVal val="visible"/>
-                                      </p:to>
-                                    </p:set>
-                                    <p:animEffect transition="in" filter="fade">
-                                      <p:cBhvr>
-                                        <p:cTn id="12" dur="500"/>
-                                        <p:tgtEl>
-                                          <p:spTgt spid="3">
-                                            <p:txEl>
-                                              <p:pRg st="1" end="1"/>
-                                            </p:txEl>
-                                          </p:spTgt>
-                                        </p:tgtEl>
-                                      </p:cBhvr>
-                                    </p:animEffect>
-                                  </p:childTnLst>
-                                </p:cTn>
-                              </p:par>
-                            </p:childTnLst>
-                          </p:cTn>
-                        </p:par>
-                      </p:childTnLst>
-                    </p:cTn>
-                  </p:par>
-                  <p:par>
-                    <p:cTn id="13" fill="hold">
-                      <p:stCondLst>
-                        <p:cond delay="indefinite"/>
-                      </p:stCondLst>
-                      <p:childTnLst>
-                        <p:par>
-                          <p:cTn id="14" fill="hold">
-                            <p:stCondLst>
-                              <p:cond delay="0"/>
-                            </p:stCondLst>
-                            <p:childTnLst>
-                              <p:par>
-                                <p:cTn id="15" presetID="10" presetClass="entr" presetSubtype="0" fill="hold" nodeType="clickEffect">
-                                  <p:stCondLst>
-                                    <p:cond delay="0"/>
-                                  </p:stCondLst>
-                                  <p:childTnLst>
-                                    <p:set>
-                                      <p:cBhvr>
-                                        <p:cTn id="16" dur="1" fill="hold">
-                                          <p:stCondLst>
-                                            <p:cond delay="0"/>
-                                          </p:stCondLst>
-                                        </p:cTn>
-                                        <p:tgtEl>
-                                          <p:spTgt spid="3">
-                                            <p:txEl>
-                                              <p:pRg st="2" end="2"/>
-                                            </p:txEl>
-                                          </p:spTgt>
-                                        </p:tgtEl>
-                                        <p:attrNameLst>
-                                          <p:attrName>style.visibility</p:attrName>
-                                        </p:attrNameLst>
-                                      </p:cBhvr>
-                                      <p:to>
-                                        <p:strVal val="visible"/>
-                                      </p:to>
-                                    </p:set>
-                                    <p:animEffect transition="in" filter="fade">
-                                      <p:cBhvr>
-                                        <p:cTn id="17" dur="500"/>
-                                        <p:tgtEl>
-                                          <p:spTgt spid="3">
-                                            <p:txEl>
-                                              <p:pRg st="2" end="2"/>
-                                            </p:txEl>
-                                          </p:spTgt>
-                                        </p:tgtEl>
-                                      </p:cBhvr>
-                                    </p:animEffect>
-                                  </p:childTnLst>
-                                </p:cTn>
-                              </p:par>
-                            </p:childTnLst>
-                          </p:cTn>
-                        </p:par>
-                      </p:childTnLst>
-                    </p:cTn>
-                  </p:par>
-                  <p:par>
-                    <p:cTn id="18" fill="hold">
-                      <p:stCondLst>
-                        <p:cond delay="indefinite"/>
-                      </p:stCondLst>
-                      <p:childTnLst>
-                        <p:par>
-                          <p:cTn id="19" fill="hold">
-                            <p:stCondLst>
-                              <p:cond delay="0"/>
-                            </p:stCondLst>
-                            <p:childTnLst>
-                              <p:par>
-                                <p:cTn id="20" presetID="10" presetClass="entr" presetSubtype="0" fill="hold" nodeType="clickEffect">
-                                  <p:stCondLst>
-                                    <p:cond delay="0"/>
-                                  </p:stCondLst>
-                                  <p:childTnLst>
-                                    <p:set>
-                                      <p:cBhvr>
-                                        <p:cTn id="21" dur="1" fill="hold">
-                                          <p:stCondLst>
-                                            <p:cond delay="0"/>
-                                          </p:stCondLst>
-                                        </p:cTn>
-                                        <p:tgtEl>
-                                          <p:spTgt spid="3">
-                                            <p:txEl>
-                                              <p:pRg st="3" end="3"/>
-                                            </p:txEl>
-                                          </p:spTgt>
-                                        </p:tgtEl>
-                                        <p:attrNameLst>
-                                          <p:attrName>style.visibility</p:attrName>
-                                        </p:attrNameLst>
-                                      </p:cBhvr>
-                                      <p:to>
-                                        <p:strVal val="visible"/>
-                                      </p:to>
-                                    </p:set>
-                                    <p:animEffect transition="in" filter="fade">
-                                      <p:cBhvr>
-                                        <p:cTn id="22" dur="500"/>
-                                        <p:tgtEl>
-                                          <p:spTgt spid="3">
-                                            <p:txEl>
-                                              <p:pRg st="3" end="3"/>
-                                            </p:txEl>
-                                          </p:spTgt>
-                                        </p:tgtEl>
-                                      </p:cBhvr>
-                                    </p:animEffect>
-                                  </p:childTnLst>
-                                </p:cTn>
-                              </p:par>
-                            </p:childTnLst>
-                          </p:cTn>
-                        </p:par>
-                      </p:childTnLst>
-                    </p:cTn>
-                  </p:par>
-                  <p:par>
-                    <p:cTn id="23" fill="hold">
-                      <p:stCondLst>
-                        <p:cond delay="indefinite"/>
-                      </p:stCondLst>
-                      <p:childTnLst>
-                        <p:par>
-                          <p:cTn id="24" fill="hold">
-                            <p:stCondLst>
-                              <p:cond delay="0"/>
-                            </p:stCondLst>
-                            <p:childTnLst>
-                              <p:par>
-                                <p:cTn id="25" presetID="10" presetClass="entr" presetSubtype="0" fill="hold" nodeType="clickEffect">
-                                  <p:stCondLst>
-                                    <p:cond delay="0"/>
-                                  </p:stCondLst>
-                                  <p:childTnLst>
-                                    <p:set>
-                                      <p:cBhvr>
-                                        <p:cTn id="26" dur="1" fill="hold">
-                                          <p:stCondLst>
-                                            <p:cond delay="0"/>
-                                          </p:stCondLst>
-                                        </p:cTn>
-                                        <p:tgtEl>
-                                          <p:spTgt spid="3">
-                                            <p:txEl>
-                                              <p:pRg st="4" end="4"/>
-                                            </p:txEl>
-                                          </p:spTgt>
-                                        </p:tgtEl>
-                                        <p:attrNameLst>
-                                          <p:attrName>style.visibility</p:attrName>
-                                        </p:attrNameLst>
-                                      </p:cBhvr>
-                                      <p:to>
-                                        <p:strVal val="visible"/>
-                                      </p:to>
-                                    </p:set>
-                                    <p:animEffect transition="in" filter="fade">
-                                      <p:cBhvr>
-                                        <p:cTn id="27" dur="500"/>
-                                        <p:tgtEl>
-                                          <p:spTgt spid="3">
-                                            <p:txEl>
-                                              <p:pRg st="4" end="4"/>
-                                            </p:txEl>
-                                          </p:spTgt>
-                                        </p:tgtEl>
-                                      </p:cBhvr>
-                                    </p:animEffect>
-                                  </p:childTnLst>
-                                </p:cTn>
-                              </p:par>
-                            </p:childTnLst>
-                          </p:cTn>
-                        </p:par>
-                      </p:childTnLst>
-                    </p:cTn>
-                  </p:par>
-                  <p:par>
-                    <p:cTn id="28" fill="hold">
-                      <p:stCondLst>
-                        <p:cond delay="indefinite"/>
-                      </p:stCondLst>
-                      <p:childTnLst>
-                        <p:par>
-                          <p:cTn id="29" fill="hold">
-                            <p:stCondLst>
-                              <p:cond delay="0"/>
-                            </p:stCondLst>
-                            <p:childTnLst>
-                              <p:par>
-                                <p:cTn id="30" presetID="10" presetClass="entr" presetSubtype="0" fill="hold" nodeType="clickEffect">
-                                  <p:stCondLst>
-                                    <p:cond delay="0"/>
-                                  </p:stCondLst>
-                                  <p:childTnLst>
-                                    <p:set>
-                                      <p:cBhvr>
-                                        <p:cTn id="31" dur="1" fill="hold">
-                                          <p:stCondLst>
-                                            <p:cond delay="0"/>
-                                          </p:stCondLst>
-                                        </p:cTn>
-                                        <p:tgtEl>
-                                          <p:spTgt spid="3">
-                                            <p:txEl>
-                                              <p:pRg st="5" end="5"/>
-                                            </p:txEl>
-                                          </p:spTgt>
-                                        </p:tgtEl>
-                                        <p:attrNameLst>
-                                          <p:attrName>style.visibility</p:attrName>
-                                        </p:attrNameLst>
-                                      </p:cBhvr>
-                                      <p:to>
-                                        <p:strVal val="visible"/>
-                                      </p:to>
-                                    </p:set>
-                                    <p:animEffect transition="in" filter="fade">
-                                      <p:cBhvr>
-                                        <p:cTn id="32" dur="500"/>
-                                        <p:tgtEl>
-                                          <p:spTgt spid="3">
-                                            <p:txEl>
-                                              <p:pRg st="5" end="5"/>
-                                            </p:txEl>
-                                          </p:spTgt>
-                                        </p:tgtEl>
-                                      </p:cBhvr>
-                                    </p:animEffect>
-                                  </p:childTnLst>
-                                </p:cTn>
-                              </p:par>
-                            </p:childTnLst>
-                          </p:cTn>
-                        </p:par>
-                      </p:childTnLst>
-                    </p:cTn>
-                  </p:par>
-                  <p:par>
-                    <p:cTn id="33" fill="hold">
-                      <p:stCondLst>
-                        <p:cond delay="indefinite"/>
-                      </p:stCondLst>
-                      <p:childTnLst>
-                        <p:par>
-                          <p:cTn id="34" fill="hold">
-                            <p:stCondLst>
-                              <p:cond delay="0"/>
-                            </p:stCondLst>
-                            <p:childTnLst>
-                              <p:par>
-                                <p:cTn id="35" presetID="10" presetClass="entr" presetSubtype="0" fill="hold" nodeType="clickEffect">
-                                  <p:stCondLst>
-                                    <p:cond delay="0"/>
-                                  </p:stCondLst>
-                                  <p:childTnLst>
-                                    <p:set>
-                                      <p:cBhvr>
-                                        <p:cTn id="36" dur="1" fill="hold">
-                                          <p:stCondLst>
-                                            <p:cond delay="0"/>
-                                          </p:stCondLst>
-                                        </p:cTn>
-                                        <p:tgtEl>
-                                          <p:spTgt spid="3">
-                                            <p:txEl>
-                                              <p:pRg st="6" end="6"/>
-                                            </p:txEl>
-                                          </p:spTgt>
-                                        </p:tgtEl>
-                                        <p:attrNameLst>
-                                          <p:attrName>style.visibility</p:attrName>
-                                        </p:attrNameLst>
-                                      </p:cBhvr>
-                                      <p:to>
-                                        <p:strVal val="visible"/>
-                                      </p:to>
-                                    </p:set>
-                                    <p:animEffect transition="in" filter="fade">
-                                      <p:cBhvr>
-                                        <p:cTn id="37" dur="500"/>
-                                        <p:tgtEl>
-                                          <p:spTgt spid="3">
-                                            <p:txEl>
-                                              <p:pRg st="6" end="6"/>
-                                            </p:txEl>
-                                          </p:spTgt>
-                                        </p:tgtEl>
-                                      </p:cBhvr>
-                                    </p:animEffect>
-                                  </p:childTnLst>
-                                </p:cTn>
-                              </p:par>
-                            </p:childTnLst>
-                          </p:cTn>
-                        </p:par>
-                      </p:childTnLst>
-                    </p:cTn>
-                  </p:par>
-                  <p:par>
-                    <p:cTn id="38" fill="hold">
-                      <p:stCondLst>
-                        <p:cond delay="indefinite"/>
-                      </p:stCondLst>
-                      <p:childTnLst>
-                        <p:par>
-                          <p:cTn id="39" fill="hold">
-                            <p:stCondLst>
-                              <p:cond delay="0"/>
-                            </p:stCondLst>
-                            <p:childTnLst>
-                              <p:par>
-                                <p:cTn id="40" presetID="10" presetClass="entr" presetSubtype="0" fill="hold" nodeType="clickEffect">
-                                  <p:stCondLst>
-                                    <p:cond delay="0"/>
-                                  </p:stCondLst>
-                                  <p:childTnLst>
-                                    <p:set>
-                                      <p:cBhvr>
-                                        <p:cTn id="41" dur="1" fill="hold">
-                                          <p:stCondLst>
-                                            <p:cond delay="0"/>
-                                          </p:stCondLst>
-                                        </p:cTn>
-                                        <p:tgtEl>
-                                          <p:spTgt spid="3">
-                                            <p:txEl>
-                                              <p:pRg st="7" end="7"/>
-                                            </p:txEl>
-                                          </p:spTgt>
-                                        </p:tgtEl>
-                                        <p:attrNameLst>
-                                          <p:attrName>style.visibility</p:attrName>
-                                        </p:attrNameLst>
-                                      </p:cBhvr>
-                                      <p:to>
-                                        <p:strVal val="visible"/>
-                                      </p:to>
-                                    </p:set>
-                                    <p:animEffect transition="in" filter="fade">
-                                      <p:cBhvr>
-                                        <p:cTn id="42" dur="500"/>
-                                        <p:tgtEl>
-                                          <p:spTgt spid="3">
-                                            <p:txEl>
-                                              <p:pRg st="7" end="7"/>
-                                            </p:txEl>
-                                          </p:spTgt>
-                                        </p:tgtEl>
-                                      </p:cBhvr>
-                                    </p:animEffect>
-                                  </p:childTnLst>
-                                </p:cTn>
-                              </p:par>
-                            </p:childTnLst>
-                          </p:cTn>
-                        </p:par>
-                      </p:childTnLst>
-                    </p:cTn>
-                  </p:par>
-                  <p:par>
-                    <p:cTn id="43" fill="hold">
-                      <p:stCondLst>
-                        <p:cond delay="indefinite"/>
-                      </p:stCondLst>
-                      <p:childTnLst>
-                        <p:par>
-                          <p:cTn id="44" fill="hold">
-                            <p:stCondLst>
-                              <p:cond delay="0"/>
-                            </p:stCondLst>
-                            <p:childTnLst>
-                              <p:par>
-                                <p:cTn id="45" presetID="10" presetClass="entr" presetSubtype="0" fill="hold" nodeType="clickEffect">
-                                  <p:stCondLst>
-                                    <p:cond delay="0"/>
-                                  </p:stCondLst>
-                                  <p:childTnLst>
-                                    <p:set>
-                                      <p:cBhvr>
-                                        <p:cTn id="46" dur="1" fill="hold">
-                                          <p:stCondLst>
-                                            <p:cond delay="0"/>
-                                          </p:stCondLst>
-                                        </p:cTn>
-                                        <p:tgtEl>
-                                          <p:spTgt spid="3">
-                                            <p:txEl>
-                                              <p:pRg st="8" end="8"/>
-                                            </p:txEl>
-                                          </p:spTgt>
-                                        </p:tgtEl>
-                                        <p:attrNameLst>
-                                          <p:attrName>style.visibility</p:attrName>
-                                        </p:attrNameLst>
-                                      </p:cBhvr>
-                                      <p:to>
-                                        <p:strVal val="visible"/>
-                                      </p:to>
-                                    </p:set>
-                                    <p:animEffect transition="in" filter="fade">
-                                      <p:cBhvr>
-                                        <p:cTn id="47" dur="500"/>
-                                        <p:tgtEl>
-                                          <p:spTgt spid="3">
-                                            <p:txEl>
-                                              <p:pRg st="8" end="8"/>
-                                            </p:txEl>
-                                          </p:spTgt>
-                                        </p:tgtEl>
-                                      </p:cBhvr>
-                                    </p:animEffect>
-                                  </p:childTnLst>
-                                </p:cTn>
-                              </p:par>
-                            </p:childTnLst>
-                          </p:cTn>
-                        </p:par>
-                      </p:childTnLst>
-                    </p:cTn>
-                  </p:par>
-                  <p:par>
-                    <p:cTn id="48" fill="hold">
-                      <p:stCondLst>
-                        <p:cond delay="indefinite"/>
-                      </p:stCondLst>
-                      <p:childTnLst>
-                        <p:par>
-                          <p:cTn id="49" fill="hold">
-                            <p:stCondLst>
-                              <p:cond delay="0"/>
-                            </p:stCondLst>
-                            <p:childTnLst>
-                              <p:par>
-                                <p:cTn id="50" presetID="10" presetClass="entr" presetSubtype="0" fill="hold" nodeType="clickEffect">
-                                  <p:stCondLst>
-                                    <p:cond delay="0"/>
-                                  </p:stCondLst>
-                                  <p:childTnLst>
-                                    <p:set>
-                                      <p:cBhvr>
-                                        <p:cTn id="51" dur="1" fill="hold">
-                                          <p:stCondLst>
-                                            <p:cond delay="0"/>
-                                          </p:stCondLst>
-                                        </p:cTn>
-                                        <p:tgtEl>
-                                          <p:spTgt spid="3">
-                                            <p:txEl>
-                                              <p:pRg st="9" end="9"/>
-                                            </p:txEl>
-                                          </p:spTgt>
-                                        </p:tgtEl>
-                                        <p:attrNameLst>
-                                          <p:attrName>style.visibility</p:attrName>
-                                        </p:attrNameLst>
-                                      </p:cBhvr>
-                                      <p:to>
-                                        <p:strVal val="visible"/>
-                                      </p:to>
-                                    </p:set>
-                                    <p:animEffect transition="in" filter="fade">
-                                      <p:cBhvr>
-                                        <p:cTn id="52" dur="500"/>
-                                        <p:tgtEl>
-                                          <p:spTgt spid="3">
-                                            <p:txEl>
-                                              <p:pRg st="9" end="9"/>
-                                            </p:txEl>
-                                          </p:spTgt>
+                                          <p:spTgt spid="3"/>
                                         </p:tgtEl>
                                       </p:cBhvr>
                                     </p:animEffect>
@@ -10073,6 +9302,9 @@
         </p:cTn>
       </p:par>
     </p:tnLst>
+    <p:bldLst>
+      <p:bldP spid="3" grpId="0"/>
+    </p:bldLst>
   </p:timing>
 </p:sld>
 </file>
@@ -10436,7 +9668,7 @@
                             </p:stCondLst>
                             <p:childTnLst>
                               <p:par>
-                                <p:cTn id="5" presetID="10" presetClass="entr" presetSubtype="0" fill="hold" nodeType="clickEffect">
+                                <p:cTn id="5" presetID="10" presetClass="entr" presetSubtype="0" fill="hold" grpId="0" nodeType="clickEffect">
                                   <p:stCondLst>
                                     <p:cond delay="0"/>
                                   </p:stCondLst>
@@ -10449,11 +9681,7 @@
                                           </p:stCondLst>
                                         </p:cTn>
                                         <p:tgtEl>
-                                          <p:spTgt spid="3">
-                                            <p:txEl>
-                                              <p:pRg st="0" end="0"/>
-                                            </p:txEl>
-                                          </p:spTgt>
+                                          <p:spTgt spid="3"/>
                                         </p:tgtEl>
                                         <p:attrNameLst>
                                           <p:attrName>style.visibility</p:attrName>
@@ -10467,560 +9695,7 @@
                                       <p:cBhvr>
                                         <p:cTn id="7" dur="500"/>
                                         <p:tgtEl>
-                                          <p:spTgt spid="3">
-                                            <p:txEl>
-                                              <p:pRg st="0" end="0"/>
-                                            </p:txEl>
-                                          </p:spTgt>
-                                        </p:tgtEl>
-                                      </p:cBhvr>
-                                    </p:animEffect>
-                                  </p:childTnLst>
-                                </p:cTn>
-                              </p:par>
-                            </p:childTnLst>
-                          </p:cTn>
-                        </p:par>
-                      </p:childTnLst>
-                    </p:cTn>
-                  </p:par>
-                  <p:par>
-                    <p:cTn id="8" fill="hold">
-                      <p:stCondLst>
-                        <p:cond delay="indefinite"/>
-                      </p:stCondLst>
-                      <p:childTnLst>
-                        <p:par>
-                          <p:cTn id="9" fill="hold">
-                            <p:stCondLst>
-                              <p:cond delay="0"/>
-                            </p:stCondLst>
-                            <p:childTnLst>
-                              <p:par>
-                                <p:cTn id="10" presetID="10" presetClass="entr" presetSubtype="0" fill="hold" nodeType="clickEffect">
-                                  <p:stCondLst>
-                                    <p:cond delay="0"/>
-                                  </p:stCondLst>
-                                  <p:childTnLst>
-                                    <p:set>
-                                      <p:cBhvr>
-                                        <p:cTn id="11" dur="1" fill="hold">
-                                          <p:stCondLst>
-                                            <p:cond delay="0"/>
-                                          </p:stCondLst>
-                                        </p:cTn>
-                                        <p:tgtEl>
-                                          <p:spTgt spid="3">
-                                            <p:txEl>
-                                              <p:pRg st="1" end="1"/>
-                                            </p:txEl>
-                                          </p:spTgt>
-                                        </p:tgtEl>
-                                        <p:attrNameLst>
-                                          <p:attrName>style.visibility</p:attrName>
-                                        </p:attrNameLst>
-                                      </p:cBhvr>
-                                      <p:to>
-                                        <p:strVal val="visible"/>
-                                      </p:to>
-                                    </p:set>
-                                    <p:animEffect transition="in" filter="fade">
-                                      <p:cBhvr>
-                                        <p:cTn id="12" dur="500"/>
-                                        <p:tgtEl>
-                                          <p:spTgt spid="3">
-                                            <p:txEl>
-                                              <p:pRg st="1" end="1"/>
-                                            </p:txEl>
-                                          </p:spTgt>
-                                        </p:tgtEl>
-                                      </p:cBhvr>
-                                    </p:animEffect>
-                                  </p:childTnLst>
-                                </p:cTn>
-                              </p:par>
-                            </p:childTnLst>
-                          </p:cTn>
-                        </p:par>
-                      </p:childTnLst>
-                    </p:cTn>
-                  </p:par>
-                  <p:par>
-                    <p:cTn id="13" fill="hold">
-                      <p:stCondLst>
-                        <p:cond delay="indefinite"/>
-                      </p:stCondLst>
-                      <p:childTnLst>
-                        <p:par>
-                          <p:cTn id="14" fill="hold">
-                            <p:stCondLst>
-                              <p:cond delay="0"/>
-                            </p:stCondLst>
-                            <p:childTnLst>
-                              <p:par>
-                                <p:cTn id="15" presetID="10" presetClass="entr" presetSubtype="0" fill="hold" nodeType="clickEffect">
-                                  <p:stCondLst>
-                                    <p:cond delay="0"/>
-                                  </p:stCondLst>
-                                  <p:childTnLst>
-                                    <p:set>
-                                      <p:cBhvr>
-                                        <p:cTn id="16" dur="1" fill="hold">
-                                          <p:stCondLst>
-                                            <p:cond delay="0"/>
-                                          </p:stCondLst>
-                                        </p:cTn>
-                                        <p:tgtEl>
-                                          <p:spTgt spid="3">
-                                            <p:txEl>
-                                              <p:pRg st="2" end="2"/>
-                                            </p:txEl>
-                                          </p:spTgt>
-                                        </p:tgtEl>
-                                        <p:attrNameLst>
-                                          <p:attrName>style.visibility</p:attrName>
-                                        </p:attrNameLst>
-                                      </p:cBhvr>
-                                      <p:to>
-                                        <p:strVal val="visible"/>
-                                      </p:to>
-                                    </p:set>
-                                    <p:animEffect transition="in" filter="fade">
-                                      <p:cBhvr>
-                                        <p:cTn id="17" dur="500"/>
-                                        <p:tgtEl>
-                                          <p:spTgt spid="3">
-                                            <p:txEl>
-                                              <p:pRg st="2" end="2"/>
-                                            </p:txEl>
-                                          </p:spTgt>
-                                        </p:tgtEl>
-                                      </p:cBhvr>
-                                    </p:animEffect>
-                                  </p:childTnLst>
-                                </p:cTn>
-                              </p:par>
-                            </p:childTnLst>
-                          </p:cTn>
-                        </p:par>
-                      </p:childTnLst>
-                    </p:cTn>
-                  </p:par>
-                  <p:par>
-                    <p:cTn id="18" fill="hold">
-                      <p:stCondLst>
-                        <p:cond delay="indefinite"/>
-                      </p:stCondLst>
-                      <p:childTnLst>
-                        <p:par>
-                          <p:cTn id="19" fill="hold">
-                            <p:stCondLst>
-                              <p:cond delay="0"/>
-                            </p:stCondLst>
-                            <p:childTnLst>
-                              <p:par>
-                                <p:cTn id="20" presetID="10" presetClass="entr" presetSubtype="0" fill="hold" nodeType="clickEffect">
-                                  <p:stCondLst>
-                                    <p:cond delay="0"/>
-                                  </p:stCondLst>
-                                  <p:childTnLst>
-                                    <p:set>
-                                      <p:cBhvr>
-                                        <p:cTn id="21" dur="1" fill="hold">
-                                          <p:stCondLst>
-                                            <p:cond delay="0"/>
-                                          </p:stCondLst>
-                                        </p:cTn>
-                                        <p:tgtEl>
-                                          <p:spTgt spid="3">
-                                            <p:txEl>
-                                              <p:pRg st="3" end="3"/>
-                                            </p:txEl>
-                                          </p:spTgt>
-                                        </p:tgtEl>
-                                        <p:attrNameLst>
-                                          <p:attrName>style.visibility</p:attrName>
-                                        </p:attrNameLst>
-                                      </p:cBhvr>
-                                      <p:to>
-                                        <p:strVal val="visible"/>
-                                      </p:to>
-                                    </p:set>
-                                    <p:animEffect transition="in" filter="fade">
-                                      <p:cBhvr>
-                                        <p:cTn id="22" dur="500"/>
-                                        <p:tgtEl>
-                                          <p:spTgt spid="3">
-                                            <p:txEl>
-                                              <p:pRg st="3" end="3"/>
-                                            </p:txEl>
-                                          </p:spTgt>
-                                        </p:tgtEl>
-                                      </p:cBhvr>
-                                    </p:animEffect>
-                                  </p:childTnLst>
-                                </p:cTn>
-                              </p:par>
-                            </p:childTnLst>
-                          </p:cTn>
-                        </p:par>
-                      </p:childTnLst>
-                    </p:cTn>
-                  </p:par>
-                  <p:par>
-                    <p:cTn id="23" fill="hold">
-                      <p:stCondLst>
-                        <p:cond delay="indefinite"/>
-                      </p:stCondLst>
-                      <p:childTnLst>
-                        <p:par>
-                          <p:cTn id="24" fill="hold">
-                            <p:stCondLst>
-                              <p:cond delay="0"/>
-                            </p:stCondLst>
-                            <p:childTnLst>
-                              <p:par>
-                                <p:cTn id="25" presetID="10" presetClass="entr" presetSubtype="0" fill="hold" nodeType="clickEffect">
-                                  <p:stCondLst>
-                                    <p:cond delay="0"/>
-                                  </p:stCondLst>
-                                  <p:childTnLst>
-                                    <p:set>
-                                      <p:cBhvr>
-                                        <p:cTn id="26" dur="1" fill="hold">
-                                          <p:stCondLst>
-                                            <p:cond delay="0"/>
-                                          </p:stCondLst>
-                                        </p:cTn>
-                                        <p:tgtEl>
-                                          <p:spTgt spid="3">
-                                            <p:txEl>
-                                              <p:pRg st="4" end="4"/>
-                                            </p:txEl>
-                                          </p:spTgt>
-                                        </p:tgtEl>
-                                        <p:attrNameLst>
-                                          <p:attrName>style.visibility</p:attrName>
-                                        </p:attrNameLst>
-                                      </p:cBhvr>
-                                      <p:to>
-                                        <p:strVal val="visible"/>
-                                      </p:to>
-                                    </p:set>
-                                    <p:animEffect transition="in" filter="fade">
-                                      <p:cBhvr>
-                                        <p:cTn id="27" dur="500"/>
-                                        <p:tgtEl>
-                                          <p:spTgt spid="3">
-                                            <p:txEl>
-                                              <p:pRg st="4" end="4"/>
-                                            </p:txEl>
-                                          </p:spTgt>
-                                        </p:tgtEl>
-                                      </p:cBhvr>
-                                    </p:animEffect>
-                                  </p:childTnLst>
-                                </p:cTn>
-                              </p:par>
-                            </p:childTnLst>
-                          </p:cTn>
-                        </p:par>
-                      </p:childTnLst>
-                    </p:cTn>
-                  </p:par>
-                  <p:par>
-                    <p:cTn id="28" fill="hold">
-                      <p:stCondLst>
-                        <p:cond delay="indefinite"/>
-                      </p:stCondLst>
-                      <p:childTnLst>
-                        <p:par>
-                          <p:cTn id="29" fill="hold">
-                            <p:stCondLst>
-                              <p:cond delay="0"/>
-                            </p:stCondLst>
-                            <p:childTnLst>
-                              <p:par>
-                                <p:cTn id="30" presetID="10" presetClass="entr" presetSubtype="0" fill="hold" nodeType="clickEffect">
-                                  <p:stCondLst>
-                                    <p:cond delay="0"/>
-                                  </p:stCondLst>
-                                  <p:childTnLst>
-                                    <p:set>
-                                      <p:cBhvr>
-                                        <p:cTn id="31" dur="1" fill="hold">
-                                          <p:stCondLst>
-                                            <p:cond delay="0"/>
-                                          </p:stCondLst>
-                                        </p:cTn>
-                                        <p:tgtEl>
-                                          <p:spTgt spid="3">
-                                            <p:txEl>
-                                              <p:pRg st="5" end="5"/>
-                                            </p:txEl>
-                                          </p:spTgt>
-                                        </p:tgtEl>
-                                        <p:attrNameLst>
-                                          <p:attrName>style.visibility</p:attrName>
-                                        </p:attrNameLst>
-                                      </p:cBhvr>
-                                      <p:to>
-                                        <p:strVal val="visible"/>
-                                      </p:to>
-                                    </p:set>
-                                    <p:animEffect transition="in" filter="fade">
-                                      <p:cBhvr>
-                                        <p:cTn id="32" dur="500"/>
-                                        <p:tgtEl>
-                                          <p:spTgt spid="3">
-                                            <p:txEl>
-                                              <p:pRg st="5" end="5"/>
-                                            </p:txEl>
-                                          </p:spTgt>
-                                        </p:tgtEl>
-                                      </p:cBhvr>
-                                    </p:animEffect>
-                                  </p:childTnLst>
-                                </p:cTn>
-                              </p:par>
-                            </p:childTnLst>
-                          </p:cTn>
-                        </p:par>
-                      </p:childTnLst>
-                    </p:cTn>
-                  </p:par>
-                  <p:par>
-                    <p:cTn id="33" fill="hold">
-                      <p:stCondLst>
-                        <p:cond delay="indefinite"/>
-                      </p:stCondLst>
-                      <p:childTnLst>
-                        <p:par>
-                          <p:cTn id="34" fill="hold">
-                            <p:stCondLst>
-                              <p:cond delay="0"/>
-                            </p:stCondLst>
-                            <p:childTnLst>
-                              <p:par>
-                                <p:cTn id="35" presetID="10" presetClass="entr" presetSubtype="0" fill="hold" nodeType="clickEffect">
-                                  <p:stCondLst>
-                                    <p:cond delay="0"/>
-                                  </p:stCondLst>
-                                  <p:childTnLst>
-                                    <p:set>
-                                      <p:cBhvr>
-                                        <p:cTn id="36" dur="1" fill="hold">
-                                          <p:stCondLst>
-                                            <p:cond delay="0"/>
-                                          </p:stCondLst>
-                                        </p:cTn>
-                                        <p:tgtEl>
-                                          <p:spTgt spid="3">
-                                            <p:txEl>
-                                              <p:pRg st="6" end="6"/>
-                                            </p:txEl>
-                                          </p:spTgt>
-                                        </p:tgtEl>
-                                        <p:attrNameLst>
-                                          <p:attrName>style.visibility</p:attrName>
-                                        </p:attrNameLst>
-                                      </p:cBhvr>
-                                      <p:to>
-                                        <p:strVal val="visible"/>
-                                      </p:to>
-                                    </p:set>
-                                    <p:animEffect transition="in" filter="fade">
-                                      <p:cBhvr>
-                                        <p:cTn id="37" dur="500"/>
-                                        <p:tgtEl>
-                                          <p:spTgt spid="3">
-                                            <p:txEl>
-                                              <p:pRg st="6" end="6"/>
-                                            </p:txEl>
-                                          </p:spTgt>
-                                        </p:tgtEl>
-                                      </p:cBhvr>
-                                    </p:animEffect>
-                                  </p:childTnLst>
-                                </p:cTn>
-                              </p:par>
-                            </p:childTnLst>
-                          </p:cTn>
-                        </p:par>
-                      </p:childTnLst>
-                    </p:cTn>
-                  </p:par>
-                  <p:par>
-                    <p:cTn id="38" fill="hold">
-                      <p:stCondLst>
-                        <p:cond delay="indefinite"/>
-                      </p:stCondLst>
-                      <p:childTnLst>
-                        <p:par>
-                          <p:cTn id="39" fill="hold">
-                            <p:stCondLst>
-                              <p:cond delay="0"/>
-                            </p:stCondLst>
-                            <p:childTnLst>
-                              <p:par>
-                                <p:cTn id="40" presetID="10" presetClass="entr" presetSubtype="0" fill="hold" nodeType="clickEffect">
-                                  <p:stCondLst>
-                                    <p:cond delay="0"/>
-                                  </p:stCondLst>
-                                  <p:childTnLst>
-                                    <p:set>
-                                      <p:cBhvr>
-                                        <p:cTn id="41" dur="1" fill="hold">
-                                          <p:stCondLst>
-                                            <p:cond delay="0"/>
-                                          </p:stCondLst>
-                                        </p:cTn>
-                                        <p:tgtEl>
-                                          <p:spTgt spid="3">
-                                            <p:txEl>
-                                              <p:pRg st="7" end="7"/>
-                                            </p:txEl>
-                                          </p:spTgt>
-                                        </p:tgtEl>
-                                        <p:attrNameLst>
-                                          <p:attrName>style.visibility</p:attrName>
-                                        </p:attrNameLst>
-                                      </p:cBhvr>
-                                      <p:to>
-                                        <p:strVal val="visible"/>
-                                      </p:to>
-                                    </p:set>
-                                    <p:animEffect transition="in" filter="fade">
-                                      <p:cBhvr>
-                                        <p:cTn id="42" dur="500"/>
-                                        <p:tgtEl>
-                                          <p:spTgt spid="3">
-                                            <p:txEl>
-                                              <p:pRg st="7" end="7"/>
-                                            </p:txEl>
-                                          </p:spTgt>
-                                        </p:tgtEl>
-                                      </p:cBhvr>
-                                    </p:animEffect>
-                                  </p:childTnLst>
-                                </p:cTn>
-                              </p:par>
-                            </p:childTnLst>
-                          </p:cTn>
-                        </p:par>
-                      </p:childTnLst>
-                    </p:cTn>
-                  </p:par>
-                  <p:par>
-                    <p:cTn id="43" fill="hold">
-                      <p:stCondLst>
-                        <p:cond delay="indefinite"/>
-                      </p:stCondLst>
-                      <p:childTnLst>
-                        <p:par>
-                          <p:cTn id="44" fill="hold">
-                            <p:stCondLst>
-                              <p:cond delay="0"/>
-                            </p:stCondLst>
-                            <p:childTnLst>
-                              <p:par>
-                                <p:cTn id="45" presetID="10" presetClass="entr" presetSubtype="0" fill="hold" nodeType="clickEffect">
-                                  <p:stCondLst>
-                                    <p:cond delay="0"/>
-                                  </p:stCondLst>
-                                  <p:childTnLst>
-                                    <p:set>
-                                      <p:cBhvr>
-                                        <p:cTn id="46" dur="1" fill="hold">
-                                          <p:stCondLst>
-                                            <p:cond delay="0"/>
-                                          </p:stCondLst>
-                                        </p:cTn>
-                                        <p:tgtEl>
-                                          <p:spTgt spid="3">
-                                            <p:txEl>
-                                              <p:pRg st="8" end="8"/>
-                                            </p:txEl>
-                                          </p:spTgt>
-                                        </p:tgtEl>
-                                        <p:attrNameLst>
-                                          <p:attrName>style.visibility</p:attrName>
-                                        </p:attrNameLst>
-                                      </p:cBhvr>
-                                      <p:to>
-                                        <p:strVal val="visible"/>
-                                      </p:to>
-                                    </p:set>
-                                    <p:animEffect transition="in" filter="fade">
-                                      <p:cBhvr>
-                                        <p:cTn id="47" dur="500"/>
-                                        <p:tgtEl>
-                                          <p:spTgt spid="3">
-                                            <p:txEl>
-                                              <p:pRg st="8" end="8"/>
-                                            </p:txEl>
-                                          </p:spTgt>
-                                        </p:tgtEl>
-                                      </p:cBhvr>
-                                    </p:animEffect>
-                                  </p:childTnLst>
-                                </p:cTn>
-                              </p:par>
-                            </p:childTnLst>
-                          </p:cTn>
-                        </p:par>
-                      </p:childTnLst>
-                    </p:cTn>
-                  </p:par>
-                  <p:par>
-                    <p:cTn id="48" fill="hold">
-                      <p:stCondLst>
-                        <p:cond delay="indefinite"/>
-                      </p:stCondLst>
-                      <p:childTnLst>
-                        <p:par>
-                          <p:cTn id="49" fill="hold">
-                            <p:stCondLst>
-                              <p:cond delay="0"/>
-                            </p:stCondLst>
-                            <p:childTnLst>
-                              <p:par>
-                                <p:cTn id="50" presetID="10" presetClass="entr" presetSubtype="0" fill="hold" nodeType="clickEffect">
-                                  <p:stCondLst>
-                                    <p:cond delay="0"/>
-                                  </p:stCondLst>
-                                  <p:childTnLst>
-                                    <p:set>
-                                      <p:cBhvr>
-                                        <p:cTn id="51" dur="1" fill="hold">
-                                          <p:stCondLst>
-                                            <p:cond delay="0"/>
-                                          </p:stCondLst>
-                                        </p:cTn>
-                                        <p:tgtEl>
-                                          <p:spTgt spid="3">
-                                            <p:txEl>
-                                              <p:pRg st="9" end="9"/>
-                                            </p:txEl>
-                                          </p:spTgt>
-                                        </p:tgtEl>
-                                        <p:attrNameLst>
-                                          <p:attrName>style.visibility</p:attrName>
-                                        </p:attrNameLst>
-                                      </p:cBhvr>
-                                      <p:to>
-                                        <p:strVal val="visible"/>
-                                      </p:to>
-                                    </p:set>
-                                    <p:animEffect transition="in" filter="fade">
-                                      <p:cBhvr>
-                                        <p:cTn id="52" dur="500"/>
-                                        <p:tgtEl>
-                                          <p:spTgt spid="3">
-                                            <p:txEl>
-                                              <p:pRg st="9" end="9"/>
-                                            </p:txEl>
-                                          </p:spTgt>
+                                          <p:spTgt spid="3"/>
                                         </p:tgtEl>
                                       </p:cBhvr>
                                     </p:animEffect>
@@ -11054,6 +9729,9 @@
         </p:cTn>
       </p:par>
     </p:tnLst>
+    <p:bldLst>
+      <p:bldP spid="3" grpId="0"/>
+    </p:bldLst>
   </p:timing>
 </p:sld>
 </file>

</xml_diff>